<commit_message>
fix icon; basemap options; hover popup
</commit_message>
<xml_diff>
--- a/affrilachianpoets/icon_workspace.pptx
+++ b/affrilachianpoets/icon_workspace.pptx
@@ -7,6 +7,10 @@
   <p:sldIdLst>
     <p:sldId id="256" r:id="rId2"/>
     <p:sldId id="257" r:id="rId3"/>
+    <p:sldId id="258" r:id="rId4"/>
+    <p:sldId id="259" r:id="rId5"/>
+    <p:sldId id="260" r:id="rId6"/>
+    <p:sldId id="261" r:id="rId7"/>
   </p:sldIdLst>
   <p:sldSz cx="12192000" cy="6858000"/>
   <p:notesSz cx="6858000" cy="9144000"/>
@@ -105,6 +109,11 @@
       </a:defRPr>
     </a:lvl9pPr>
   </p:defaultTextStyle>
+  <p:extLst>
+    <p:ext uri="{EFAFB233-063F-42B5-8137-9DF3F51BA10A}">
+      <p15:sldGuideLst xmlns:p15="http://schemas.microsoft.com/office/powerpoint/2012/main"/>
+    </p:ext>
+  </p:extLst>
 </p:presentation>
 </file>
 
@@ -153,7 +162,6 @@
               <a:rPr lang="en-US"/>
               <a:t>Click to edit Master title style</a:t>
             </a:r>
-            <a:endParaRPr lang="en-US"/>
           </a:p>
         </p:txBody>
       </p:sp>
@@ -218,7 +226,6 @@
               <a:rPr lang="en-US"/>
               <a:t>Click to edit Master subtitle style</a:t>
             </a:r>
-            <a:endParaRPr lang="en-US"/>
           </a:p>
         </p:txBody>
       </p:sp>
@@ -239,7 +246,7 @@
           <a:p>
             <a:fld id="{911B6E6F-C3BF-40C1-B45A-546187C6EDC0}" type="datetimeFigureOut">
               <a:rPr lang="en-US" smtClean="0"/>
-              <a:t>12/16/2016</a:t>
+              <a:t>12/29/2016</a:t>
             </a:fld>
             <a:endParaRPr lang="en-US"/>
           </a:p>
@@ -336,7 +343,6 @@
               <a:rPr lang="en-US"/>
               <a:t>Click to edit Master title style</a:t>
             </a:r>
-            <a:endParaRPr lang="en-US"/>
           </a:p>
         </p:txBody>
       </p:sp>
@@ -388,7 +394,6 @@
               <a:rPr lang="en-US"/>
               <a:t>Fifth level</a:t>
             </a:r>
-            <a:endParaRPr lang="en-US"/>
           </a:p>
         </p:txBody>
       </p:sp>
@@ -409,7 +414,7 @@
           <a:p>
             <a:fld id="{911B6E6F-C3BF-40C1-B45A-546187C6EDC0}" type="datetimeFigureOut">
               <a:rPr lang="en-US" smtClean="0"/>
-              <a:t>12/16/2016</a:t>
+              <a:t>12/29/2016</a:t>
             </a:fld>
             <a:endParaRPr lang="en-US"/>
           </a:p>
@@ -511,7 +516,6 @@
               <a:rPr lang="en-US"/>
               <a:t>Click to edit Master title style</a:t>
             </a:r>
-            <a:endParaRPr lang="en-US"/>
           </a:p>
         </p:txBody>
       </p:sp>
@@ -568,7 +572,6 @@
               <a:rPr lang="en-US"/>
               <a:t>Fifth level</a:t>
             </a:r>
-            <a:endParaRPr lang="en-US"/>
           </a:p>
         </p:txBody>
       </p:sp>
@@ -589,7 +592,7 @@
           <a:p>
             <a:fld id="{911B6E6F-C3BF-40C1-B45A-546187C6EDC0}" type="datetimeFigureOut">
               <a:rPr lang="en-US" smtClean="0"/>
-              <a:t>12/16/2016</a:t>
+              <a:t>12/29/2016</a:t>
             </a:fld>
             <a:endParaRPr lang="en-US"/>
           </a:p>
@@ -686,7 +689,6 @@
               <a:rPr lang="en-US"/>
               <a:t>Click to edit Master title style</a:t>
             </a:r>
-            <a:endParaRPr lang="en-US"/>
           </a:p>
         </p:txBody>
       </p:sp>
@@ -738,7 +740,6 @@
               <a:rPr lang="en-US"/>
               <a:t>Fifth level</a:t>
             </a:r>
-            <a:endParaRPr lang="en-US"/>
           </a:p>
         </p:txBody>
       </p:sp>
@@ -759,7 +760,7 @@
           <a:p>
             <a:fld id="{911B6E6F-C3BF-40C1-B45A-546187C6EDC0}" type="datetimeFigureOut">
               <a:rPr lang="en-US" smtClean="0"/>
-              <a:t>12/16/2016</a:t>
+              <a:t>12/29/2016</a:t>
             </a:fld>
             <a:endParaRPr lang="en-US"/>
           </a:p>
@@ -865,7 +866,6 @@
               <a:rPr lang="en-US"/>
               <a:t>Click to edit Master title style</a:t>
             </a:r>
-            <a:endParaRPr lang="en-US"/>
           </a:p>
         </p:txBody>
       </p:sp>
@@ -1005,7 +1005,7 @@
           <a:p>
             <a:fld id="{911B6E6F-C3BF-40C1-B45A-546187C6EDC0}" type="datetimeFigureOut">
               <a:rPr lang="en-US" smtClean="0"/>
-              <a:t>12/16/2016</a:t>
+              <a:t>12/29/2016</a:t>
             </a:fld>
             <a:endParaRPr lang="en-US"/>
           </a:p>
@@ -1102,7 +1102,6 @@
               <a:rPr lang="en-US"/>
               <a:t>Click to edit Master title style</a:t>
             </a:r>
-            <a:endParaRPr lang="en-US"/>
           </a:p>
         </p:txBody>
       </p:sp>
@@ -1159,7 +1158,6 @@
               <a:rPr lang="en-US"/>
               <a:t>Fifth level</a:t>
             </a:r>
-            <a:endParaRPr lang="en-US"/>
           </a:p>
         </p:txBody>
       </p:sp>
@@ -1216,7 +1214,6 @@
               <a:rPr lang="en-US"/>
               <a:t>Fifth level</a:t>
             </a:r>
-            <a:endParaRPr lang="en-US"/>
           </a:p>
         </p:txBody>
       </p:sp>
@@ -1237,7 +1234,7 @@
           <a:p>
             <a:fld id="{911B6E6F-C3BF-40C1-B45A-546187C6EDC0}" type="datetimeFigureOut">
               <a:rPr lang="en-US" smtClean="0"/>
-              <a:t>12/16/2016</a:t>
+              <a:t>12/29/2016</a:t>
             </a:fld>
             <a:endParaRPr lang="en-US"/>
           </a:p>
@@ -1339,7 +1336,6 @@
               <a:rPr lang="en-US"/>
               <a:t>Click to edit Master title style</a:t>
             </a:r>
-            <a:endParaRPr lang="en-US"/>
           </a:p>
         </p:txBody>
       </p:sp>
@@ -1461,7 +1457,6 @@
               <a:rPr lang="en-US"/>
               <a:t>Fifth level</a:t>
             </a:r>
-            <a:endParaRPr lang="en-US"/>
           </a:p>
         </p:txBody>
       </p:sp>
@@ -1583,7 +1578,6 @@
               <a:rPr lang="en-US"/>
               <a:t>Fifth level</a:t>
             </a:r>
-            <a:endParaRPr lang="en-US"/>
           </a:p>
         </p:txBody>
       </p:sp>
@@ -1604,7 +1598,7 @@
           <a:p>
             <a:fld id="{911B6E6F-C3BF-40C1-B45A-546187C6EDC0}" type="datetimeFigureOut">
               <a:rPr lang="en-US" smtClean="0"/>
-              <a:t>12/16/2016</a:t>
+              <a:t>12/29/2016</a:t>
             </a:fld>
             <a:endParaRPr lang="en-US"/>
           </a:p>
@@ -1701,7 +1695,6 @@
               <a:rPr lang="en-US"/>
               <a:t>Click to edit Master title style</a:t>
             </a:r>
-            <a:endParaRPr lang="en-US"/>
           </a:p>
         </p:txBody>
       </p:sp>
@@ -1722,7 +1715,7 @@
           <a:p>
             <a:fld id="{911B6E6F-C3BF-40C1-B45A-546187C6EDC0}" type="datetimeFigureOut">
               <a:rPr lang="en-US" smtClean="0"/>
-              <a:t>12/16/2016</a:t>
+              <a:t>12/29/2016</a:t>
             </a:fld>
             <a:endParaRPr lang="en-US"/>
           </a:p>
@@ -1817,7 +1810,7 @@
           <a:p>
             <a:fld id="{911B6E6F-C3BF-40C1-B45A-546187C6EDC0}" type="datetimeFigureOut">
               <a:rPr lang="en-US" smtClean="0"/>
-              <a:t>12/16/2016</a:t>
+              <a:t>12/29/2016</a:t>
             </a:fld>
             <a:endParaRPr lang="en-US"/>
           </a:p>
@@ -1923,7 +1916,6 @@
               <a:rPr lang="en-US"/>
               <a:t>Click to edit Master title style</a:t>
             </a:r>
-            <a:endParaRPr lang="en-US"/>
           </a:p>
         </p:txBody>
       </p:sp>
@@ -2008,7 +2000,6 @@
               <a:rPr lang="en-US"/>
               <a:t>Fifth level</a:t>
             </a:r>
-            <a:endParaRPr lang="en-US"/>
           </a:p>
         </p:txBody>
       </p:sp>
@@ -2094,7 +2085,7 @@
           <a:p>
             <a:fld id="{911B6E6F-C3BF-40C1-B45A-546187C6EDC0}" type="datetimeFigureOut">
               <a:rPr lang="en-US" smtClean="0"/>
-              <a:t>12/16/2016</a:t>
+              <a:t>12/29/2016</a:t>
             </a:fld>
             <a:endParaRPr lang="en-US"/>
           </a:p>
@@ -2200,7 +2191,6 @@
               <a:rPr lang="en-US"/>
               <a:t>Click to edit Master title style</a:t>
             </a:r>
-            <a:endParaRPr lang="en-US"/>
           </a:p>
         </p:txBody>
       </p:sp>
@@ -2347,7 +2337,7 @@
           <a:p>
             <a:fld id="{911B6E6F-C3BF-40C1-B45A-546187C6EDC0}" type="datetimeFigureOut">
               <a:rPr lang="en-US" smtClean="0"/>
-              <a:t>12/16/2016</a:t>
+              <a:t>12/29/2016</a:t>
             </a:fld>
             <a:endParaRPr lang="en-US"/>
           </a:p>
@@ -2459,7 +2449,6 @@
               <a:rPr lang="en-US"/>
               <a:t>Click to edit Master title style</a:t>
             </a:r>
-            <a:endParaRPr lang="en-US"/>
           </a:p>
         </p:txBody>
       </p:sp>
@@ -2521,7 +2510,6 @@
               <a:rPr lang="en-US"/>
               <a:t>Fifth level</a:t>
             </a:r>
-            <a:endParaRPr lang="en-US"/>
           </a:p>
         </p:txBody>
       </p:sp>
@@ -2560,7 +2548,7 @@
           <a:p>
             <a:fld id="{911B6E6F-C3BF-40C1-B45A-546187C6EDC0}" type="datetimeFigureOut">
               <a:rPr lang="en-US" smtClean="0"/>
-              <a:t>12/16/2016</a:t>
+              <a:t>12/29/2016</a:t>
             </a:fld>
             <a:endParaRPr lang="en-US"/>
           </a:p>
@@ -3110,6 +3098,497 @@
 </p:sld>
 </file>
 
+<file path=ppt/slides/slide3.xml><?xml version="1.0" encoding="utf-8"?>
+<p:sld xmlns:a="http://schemas.openxmlformats.org/drawingml/2006/main" xmlns:r="http://schemas.openxmlformats.org/officeDocument/2006/relationships" xmlns:p="http://schemas.openxmlformats.org/presentationml/2006/main">
+  <p:cSld>
+    <p:spTree>
+      <p:nvGrpSpPr>
+        <p:cNvPr id="1" name=""/>
+        <p:cNvGrpSpPr/>
+        <p:nvPr/>
+      </p:nvGrpSpPr>
+      <p:grpSpPr>
+        <a:xfrm>
+          <a:off x="0" y="0"/>
+          <a:ext cx="0" cy="0"/>
+          <a:chOff x="0" y="0"/>
+          <a:chExt cx="0" cy="0"/>
+        </a:xfrm>
+      </p:grpSpPr>
+      <p:pic>
+        <p:nvPicPr>
+          <p:cNvPr id="1026" name="Picture 2" descr="http://www.clipartkid.com/images/542/bull-skull-decal-clipart-best-clipart-best-nBjeUC-clipart.png"/>
+          <p:cNvPicPr>
+            <a:picLocks noChangeAspect="1" noChangeArrowheads="1"/>
+          </p:cNvPicPr>
+          <p:nvPr/>
+        </p:nvPicPr>
+        <p:blipFill>
+          <a:blip r:embed="rId2">
+            <a:extLst>
+              <a:ext uri="{BEBA8EAE-BF5A-486C-A8C5-ECC9F3942E4B}">
+                <a14:imgProps xmlns:a14="http://schemas.microsoft.com/office/drawing/2010/main">
+                  <a14:imgLayer r:embed="rId3">
+                    <a14:imgEffect>
+                      <a14:backgroundRemoval t="0" b="100000" l="200" r="100000">
+                        <a14:foregroundMark x1="76647" y1="41517" x2="76647" y2="41517"/>
+                        <a14:foregroundMark x1="57485" y1="58683" x2="57485" y2="58683"/>
+                        <a14:foregroundMark x1="44112" y1="63673" x2="44112" y2="63673"/>
+                        <a14:foregroundMark x1="46108" y1="89621" x2="46108" y2="89621"/>
+                        <a14:foregroundMark x1="53094" y1="90220" x2="53094" y2="90220"/>
+                        <a14:foregroundMark x1="45709" y1="81836" x2="45709" y2="81836"/>
+                        <a14:foregroundMark x1="14371" y1="28743" x2="14371" y2="28743"/>
+                        <a14:backgroundMark x1="22954" y1="33134" x2="22954" y2="33134"/>
+                        <a14:backgroundMark x1="34132" y1="61277" x2="34132" y2="61277"/>
+                        <a14:backgroundMark x1="33932" y1="54291" x2="33932" y2="54291"/>
+                      </a14:backgroundRemoval>
+                    </a14:imgEffect>
+                    <a14:imgEffect>
+                      <a14:artisticPlasticWrap/>
+                    </a14:imgEffect>
+                  </a14:imgLayer>
+                </a14:imgProps>
+              </a:ext>
+              <a:ext uri="{28A0092B-C50C-407E-A947-70E740481C1C}">
+                <a14:useLocalDpi xmlns:a14="http://schemas.microsoft.com/office/drawing/2010/main" val="0"/>
+              </a:ext>
+            </a:extLst>
+          </a:blip>
+          <a:srcRect/>
+          <a:stretch>
+            <a:fillRect/>
+          </a:stretch>
+        </p:blipFill>
+        <p:spPr bwMode="auto">
+          <a:xfrm>
+            <a:off x="1651865" y="928254"/>
+            <a:ext cx="4772025" cy="4772025"/>
+          </a:xfrm>
+          <a:prstGeom prst="rect">
+            <a:avLst/>
+          </a:prstGeom>
+          <a:noFill/>
+          <a:extLst>
+            <a:ext uri="{909E8E84-426E-40DD-AFC4-6F175D3DCCD1}">
+              <a14:hiddenFill xmlns:a14="http://schemas.microsoft.com/office/drawing/2010/main">
+                <a:solidFill>
+                  <a:srgbClr val="FFFFFF"/>
+                </a:solidFill>
+              </a14:hiddenFill>
+            </a:ext>
+          </a:extLst>
+        </p:spPr>
+      </p:pic>
+    </p:spTree>
+    <p:extLst>
+      <p:ext uri="{BB962C8B-B14F-4D97-AF65-F5344CB8AC3E}">
+        <p14:creationId xmlns:p14="http://schemas.microsoft.com/office/powerpoint/2010/main" val="359201938"/>
+      </p:ext>
+    </p:extLst>
+  </p:cSld>
+  <p:clrMapOvr>
+    <a:masterClrMapping/>
+  </p:clrMapOvr>
+</p:sld>
+</file>
+
+<file path=ppt/slides/slide4.xml><?xml version="1.0" encoding="utf-8"?>
+<p:sld xmlns:a="http://schemas.openxmlformats.org/drawingml/2006/main" xmlns:r="http://schemas.openxmlformats.org/officeDocument/2006/relationships" xmlns:p="http://schemas.openxmlformats.org/presentationml/2006/main">
+  <p:cSld>
+    <p:spTree>
+      <p:nvGrpSpPr>
+        <p:cNvPr id="1" name=""/>
+        <p:cNvGrpSpPr/>
+        <p:nvPr/>
+      </p:nvGrpSpPr>
+      <p:grpSpPr>
+        <a:xfrm>
+          <a:off x="0" y="0"/>
+          <a:ext cx="0" cy="0"/>
+          <a:chOff x="0" y="0"/>
+          <a:chExt cx="0" cy="0"/>
+        </a:xfrm>
+      </p:grpSpPr>
+      <p:pic>
+        <p:nvPicPr>
+          <p:cNvPr id="1026" name="Picture 2" descr="https://img.clipartfest.com/1c5f429f68f95112c6cd40f99fd069ee_-bull-skull-drawings-longhorn-skull-clipart_501-501.png"/>
+          <p:cNvPicPr>
+            <a:picLocks noChangeAspect="1" noChangeArrowheads="1"/>
+          </p:cNvPicPr>
+          <p:nvPr/>
+        </p:nvPicPr>
+        <p:blipFill>
+          <a:blip r:embed="rId2">
+            <a:extLst>
+              <a:ext uri="{BEBA8EAE-BF5A-486C-A8C5-ECC9F3942E4B}">
+                <a14:imgProps xmlns:a14="http://schemas.microsoft.com/office/drawing/2010/main">
+                  <a14:imgLayer r:embed="rId3">
+                    <a14:imgEffect>
+                      <a14:backgroundRemoval t="0" b="100000" l="599" r="100000">
+                        <a14:foregroundMark x1="39122" y1="43313" x2="39122" y2="43313"/>
+                        <a14:foregroundMark x1="59481" y1="43513" x2="59481" y2="43513"/>
+                        <a14:foregroundMark x1="37924" y1="34531" x2="37924" y2="34531"/>
+                        <a14:foregroundMark x1="43114" y1="31337" x2="43114" y2="31337"/>
+                        <a14:foregroundMark x1="46707" y1="46707" x2="46707" y2="46707"/>
+                        <a14:foregroundMark x1="40319" y1="51297" x2="40319" y2="51297"/>
+                        <a14:foregroundMark x1="64072" y1="49301" x2="64072" y2="49301"/>
+                        <a14:foregroundMark x1="65868" y1="38523" x2="65868" y2="38523"/>
+                        <a14:foregroundMark x1="83832" y1="30539" x2="83832" y2="30539"/>
+                        <a14:foregroundMark x1="77246" y1="41717" x2="77246" y2="41717"/>
+                        <a14:foregroundMark x1="43713" y1="57685" x2="43713" y2="57685"/>
+                        <a14:foregroundMark x1="44711" y1="64671" x2="44711" y2="64671"/>
+                        <a14:foregroundMark x1="46108" y1="59281" x2="46108" y2="59281"/>
+                        <a14:foregroundMark x1="48503" y1="53094" x2="48503" y2="53094"/>
+                        <a14:foregroundMark x1="52096" y1="70060" x2="52096" y2="70060"/>
+                        <a14:foregroundMark x1="51697" y1="54890" x2="51697" y2="54890"/>
+                        <a14:foregroundMark x1="61677" y1="74251" x2="61677" y2="74251"/>
+                        <a14:foregroundMark x1="52695" y1="89222" x2="52695" y2="89222"/>
+                        <a14:foregroundMark x1="46906" y1="90818" x2="46906" y2="90818"/>
+                        <a14:foregroundMark x1="46906" y1="86028" x2="46906" y2="86028"/>
+                        <a14:foregroundMark x1="52495" y1="84431" x2="52495" y2="84431"/>
+                        <a14:foregroundMark x1="53293" y1="80040" x2="53293" y2="80040"/>
+                        <a14:foregroundMark x1="46906" y1="83832" x2="46906" y2="83832"/>
+                        <a14:foregroundMark x1="44311" y1="84830" x2="44311" y2="84830"/>
+                        <a14:foregroundMark x1="40519" y1="79242" x2="40519" y2="79242"/>
+                        <a14:foregroundMark x1="40519" y1="73453" x2="40519" y2="73453"/>
+                        <a14:foregroundMark x1="41517" y1="63074" x2="41517" y2="63074"/>
+                        <a14:foregroundMark x1="55689" y1="85629" x2="55689" y2="85629"/>
+                        <a14:foregroundMark x1="58483" y1="77445" x2="58483" y2="77445"/>
+                        <a14:foregroundMark x1="58283" y1="65868" x2="58283" y2="65868"/>
+                        <a14:foregroundMark x1="61477" y1="54291" x2="61477" y2="54291"/>
+                        <a14:foregroundMark x1="53094" y1="49301" x2="53094" y2="49301"/>
+                        <a14:foregroundMark x1="52695" y1="37525" x2="52695" y2="37525"/>
+                        <a14:foregroundMark x1="52096" y1="28144" x2="52096" y2="28144"/>
+                        <a14:foregroundMark x1="69062" y1="31737" x2="69062" y2="31737"/>
+                        <a14:foregroundMark x1="37725" y1="59481" x2="37725" y2="59481"/>
+                        <a14:foregroundMark x1="32735" y1="48503" x2="32735" y2="48503"/>
+                        <a14:foregroundMark x1="75050" y1="33134" x2="75050" y2="33134"/>
+                        <a14:foregroundMark x1="79441" y1="33333" x2="79441" y2="33333"/>
+                        <a14:foregroundMark x1="26547" y1="28543" x2="26547" y2="28543"/>
+                        <a14:foregroundMark x1="14371" y1="10379" x2="14371" y2="10379"/>
+                        <a14:foregroundMark x1="12375" y1="15369" x2="12375" y2="15369"/>
+                        <a14:foregroundMark x1="14770" y1="19361" x2="14770" y2="19361"/>
+                      </a14:backgroundRemoval>
+                    </a14:imgEffect>
+                  </a14:imgLayer>
+                </a14:imgProps>
+              </a:ext>
+              <a:ext uri="{28A0092B-C50C-407E-A947-70E740481C1C}">
+                <a14:useLocalDpi xmlns:a14="http://schemas.microsoft.com/office/drawing/2010/main" val="0"/>
+              </a:ext>
+            </a:extLst>
+          </a:blip>
+          <a:srcRect/>
+          <a:stretch>
+            <a:fillRect/>
+          </a:stretch>
+        </p:blipFill>
+        <p:spPr bwMode="auto">
+          <a:xfrm>
+            <a:off x="1042266" y="1302327"/>
+            <a:ext cx="4772025" cy="4772025"/>
+          </a:xfrm>
+          <a:prstGeom prst="rect">
+            <a:avLst/>
+          </a:prstGeom>
+          <a:noFill/>
+          <a:extLst>
+            <a:ext uri="{909E8E84-426E-40DD-AFC4-6F175D3DCCD1}">
+              <a14:hiddenFill xmlns:a14="http://schemas.microsoft.com/office/drawing/2010/main">
+                <a:solidFill>
+                  <a:srgbClr val="FFFFFF"/>
+                </a:solidFill>
+              </a14:hiddenFill>
+            </a:ext>
+          </a:extLst>
+        </p:spPr>
+      </p:pic>
+    </p:spTree>
+    <p:extLst>
+      <p:ext uri="{BB962C8B-B14F-4D97-AF65-F5344CB8AC3E}">
+        <p14:creationId xmlns:p14="http://schemas.microsoft.com/office/powerpoint/2010/main" val="2308084352"/>
+      </p:ext>
+    </p:extLst>
+  </p:cSld>
+  <p:clrMapOvr>
+    <a:masterClrMapping/>
+  </p:clrMapOvr>
+</p:sld>
+</file>
+
+<file path=ppt/slides/slide5.xml><?xml version="1.0" encoding="utf-8"?>
+<p:sld xmlns:a="http://schemas.openxmlformats.org/drawingml/2006/main" xmlns:r="http://schemas.openxmlformats.org/officeDocument/2006/relationships" xmlns:p="http://schemas.openxmlformats.org/presentationml/2006/main">
+  <p:cSld>
+    <p:spTree>
+      <p:nvGrpSpPr>
+        <p:cNvPr id="1" name=""/>
+        <p:cNvGrpSpPr/>
+        <p:nvPr/>
+      </p:nvGrpSpPr>
+      <p:grpSpPr>
+        <a:xfrm>
+          <a:off x="0" y="0"/>
+          <a:ext cx="0" cy="0"/>
+          <a:chOff x="0" y="0"/>
+          <a:chExt cx="0" cy="0"/>
+        </a:xfrm>
+      </p:grpSpPr>
+      <p:pic>
+        <p:nvPicPr>
+          <p:cNvPr id="1026" name="Picture 2" descr="https://img.clipartfest.com/1c5f429f68f95112c6cd40f99fd069ee_-bull-skull-drawings-longhorn-skull-clipart_501-501.png"/>
+          <p:cNvPicPr>
+            <a:picLocks noChangeAspect="1" noChangeArrowheads="1"/>
+          </p:cNvPicPr>
+          <p:nvPr/>
+        </p:nvPicPr>
+        <p:blipFill>
+          <a:blip r:embed="rId2">
+            <a:extLst>
+              <a:ext uri="{BEBA8EAE-BF5A-486C-A8C5-ECC9F3942E4B}">
+                <a14:imgProps xmlns:a14="http://schemas.microsoft.com/office/drawing/2010/main">
+                  <a14:imgLayer r:embed="rId3">
+                    <a14:imgEffect>
+                      <a14:backgroundRemoval t="0" b="100000" l="599" r="100000">
+                        <a14:foregroundMark x1="39122" y1="43313" x2="39122" y2="43313"/>
+                        <a14:foregroundMark x1="59481" y1="43513" x2="59481" y2="43513"/>
+                        <a14:foregroundMark x1="37924" y1="34531" x2="37924" y2="34531"/>
+                        <a14:foregroundMark x1="43114" y1="31337" x2="43114" y2="31337"/>
+                        <a14:foregroundMark x1="46707" y1="46707" x2="46707" y2="46707"/>
+                        <a14:foregroundMark x1="40319" y1="51297" x2="40319" y2="51297"/>
+                        <a14:foregroundMark x1="64072" y1="49301" x2="64072" y2="49301"/>
+                        <a14:foregroundMark x1="65868" y1="38523" x2="65868" y2="38523"/>
+                        <a14:foregroundMark x1="83832" y1="30539" x2="83832" y2="30539"/>
+                        <a14:foregroundMark x1="77246" y1="41717" x2="77246" y2="41717"/>
+                        <a14:foregroundMark x1="43713" y1="57685" x2="43713" y2="57685"/>
+                        <a14:foregroundMark x1="44711" y1="64671" x2="44711" y2="64671"/>
+                        <a14:foregroundMark x1="46108" y1="59281" x2="46108" y2="59281"/>
+                        <a14:foregroundMark x1="48503" y1="53094" x2="48503" y2="53094"/>
+                        <a14:foregroundMark x1="52096" y1="70060" x2="52096" y2="70060"/>
+                        <a14:foregroundMark x1="51697" y1="54890" x2="51697" y2="54890"/>
+                        <a14:foregroundMark x1="61677" y1="74251" x2="61677" y2="74251"/>
+                        <a14:foregroundMark x1="52695" y1="89222" x2="52695" y2="89222"/>
+                        <a14:foregroundMark x1="46906" y1="90818" x2="46906" y2="90818"/>
+                        <a14:foregroundMark x1="46906" y1="86028" x2="46906" y2="86028"/>
+                        <a14:foregroundMark x1="52495" y1="84431" x2="52495" y2="84431"/>
+                        <a14:foregroundMark x1="53293" y1="80040" x2="53293" y2="80040"/>
+                        <a14:foregroundMark x1="46906" y1="83832" x2="46906" y2="83832"/>
+                        <a14:foregroundMark x1="44311" y1="84830" x2="44311" y2="84830"/>
+                        <a14:foregroundMark x1="40519" y1="79242" x2="40519" y2="79242"/>
+                        <a14:foregroundMark x1="40519" y1="73453" x2="40519" y2="73453"/>
+                        <a14:foregroundMark x1="41517" y1="63074" x2="41517" y2="63074"/>
+                        <a14:foregroundMark x1="55689" y1="85629" x2="55689" y2="85629"/>
+                        <a14:foregroundMark x1="58483" y1="77445" x2="58483" y2="77445"/>
+                        <a14:foregroundMark x1="58283" y1="65868" x2="58283" y2="65868"/>
+                        <a14:foregroundMark x1="61477" y1="54291" x2="61477" y2="54291"/>
+                        <a14:foregroundMark x1="53094" y1="49301" x2="53094" y2="49301"/>
+                        <a14:foregroundMark x1="52695" y1="37525" x2="52695" y2="37525"/>
+                        <a14:foregroundMark x1="52096" y1="28144" x2="52096" y2="28144"/>
+                        <a14:foregroundMark x1="69062" y1="31737" x2="69062" y2="31737"/>
+                        <a14:foregroundMark x1="37725" y1="59481" x2="37725" y2="59481"/>
+                        <a14:foregroundMark x1="32735" y1="48503" x2="32735" y2="48503"/>
+                        <a14:foregroundMark x1="75050" y1="33134" x2="75050" y2="33134"/>
+                        <a14:foregroundMark x1="79441" y1="33333" x2="79441" y2="33333"/>
+                        <a14:foregroundMark x1="26547" y1="28543" x2="26547" y2="28543"/>
+                        <a14:foregroundMark x1="14371" y1="10379" x2="14371" y2="10379"/>
+                        <a14:foregroundMark x1="12375" y1="15369" x2="12375" y2="15369"/>
+                        <a14:foregroundMark x1="14770" y1="19361" x2="14770" y2="19361"/>
+                      </a14:backgroundRemoval>
+                    </a14:imgEffect>
+                    <a14:imgEffect>
+                      <a14:sharpenSoften amount="50000"/>
+                    </a14:imgEffect>
+                    <a14:imgEffect>
+                      <a14:colorTemperature colorTemp="11200"/>
+                    </a14:imgEffect>
+                    <a14:imgEffect>
+                      <a14:brightnessContrast contrast="20000"/>
+                    </a14:imgEffect>
+                  </a14:imgLayer>
+                </a14:imgProps>
+              </a:ext>
+              <a:ext uri="{28A0092B-C50C-407E-A947-70E740481C1C}">
+                <a14:useLocalDpi xmlns:a14="http://schemas.microsoft.com/office/drawing/2010/main" val="0"/>
+              </a:ext>
+            </a:extLst>
+          </a:blip>
+          <a:srcRect/>
+          <a:stretch>
+            <a:fillRect/>
+          </a:stretch>
+        </p:blipFill>
+        <p:spPr bwMode="auto">
+          <a:xfrm>
+            <a:off x="1042266" y="1302327"/>
+            <a:ext cx="4772025" cy="4772025"/>
+          </a:xfrm>
+          <a:prstGeom prst="rect">
+            <a:avLst/>
+          </a:prstGeom>
+          <a:noFill/>
+          <a:extLst>
+            <a:ext uri="{909E8E84-426E-40DD-AFC4-6F175D3DCCD1}">
+              <a14:hiddenFill xmlns:a14="http://schemas.microsoft.com/office/drawing/2010/main">
+                <a:solidFill>
+                  <a:srgbClr val="FFFFFF"/>
+                </a:solidFill>
+              </a14:hiddenFill>
+            </a:ext>
+          </a:extLst>
+        </p:spPr>
+      </p:pic>
+    </p:spTree>
+    <p:extLst>
+      <p:ext uri="{BB962C8B-B14F-4D97-AF65-F5344CB8AC3E}">
+        <p14:creationId xmlns:p14="http://schemas.microsoft.com/office/powerpoint/2010/main" val="1895736473"/>
+      </p:ext>
+    </p:extLst>
+  </p:cSld>
+  <p:clrMapOvr>
+    <a:masterClrMapping/>
+  </p:clrMapOvr>
+</p:sld>
+</file>
+
+<file path=ppt/slides/slide6.xml><?xml version="1.0" encoding="utf-8"?>
+<p:sld xmlns:a="http://schemas.openxmlformats.org/drawingml/2006/main" xmlns:r="http://schemas.openxmlformats.org/officeDocument/2006/relationships" xmlns:p="http://schemas.openxmlformats.org/presentationml/2006/main">
+  <p:cSld>
+    <p:spTree>
+      <p:nvGrpSpPr>
+        <p:cNvPr id="1" name=""/>
+        <p:cNvGrpSpPr/>
+        <p:nvPr/>
+      </p:nvGrpSpPr>
+      <p:grpSpPr>
+        <a:xfrm>
+          <a:off x="0" y="0"/>
+          <a:ext cx="0" cy="0"/>
+          <a:chOff x="0" y="0"/>
+          <a:chExt cx="0" cy="0"/>
+        </a:xfrm>
+      </p:grpSpPr>
+      <p:pic>
+        <p:nvPicPr>
+          <p:cNvPr id="1026" name="Picture 2" descr="https://img.clipartfest.com/1c5f429f68f95112c6cd40f99fd069ee_-bull-skull-drawings-longhorn-skull-clipart_501-501.png"/>
+          <p:cNvPicPr>
+            <a:picLocks noChangeAspect="1" noChangeArrowheads="1"/>
+          </p:cNvPicPr>
+          <p:nvPr/>
+        </p:nvPicPr>
+        <p:blipFill>
+          <a:blip r:embed="rId2">
+            <a:duotone>
+              <a:schemeClr val="accent4">
+                <a:shade val="45000"/>
+                <a:satMod val="135000"/>
+              </a:schemeClr>
+              <a:prstClr val="white"/>
+            </a:duotone>
+            <a:extLst>
+              <a:ext uri="{BEBA8EAE-BF5A-486C-A8C5-ECC9F3942E4B}">
+                <a14:imgProps xmlns:a14="http://schemas.microsoft.com/office/drawing/2010/main">
+                  <a14:imgLayer r:embed="rId3">
+                    <a14:imgEffect>
+                      <a14:backgroundRemoval t="0" b="100000" l="599" r="100000">
+                        <a14:foregroundMark x1="39122" y1="43313" x2="39122" y2="43313"/>
+                        <a14:foregroundMark x1="59481" y1="43513" x2="59481" y2="43513"/>
+                        <a14:foregroundMark x1="37924" y1="34531" x2="37924" y2="34531"/>
+                        <a14:foregroundMark x1="43114" y1="31337" x2="43114" y2="31337"/>
+                        <a14:foregroundMark x1="46707" y1="46707" x2="46707" y2="46707"/>
+                        <a14:foregroundMark x1="40319" y1="51297" x2="40319" y2="51297"/>
+                        <a14:foregroundMark x1="64072" y1="49301" x2="64072" y2="49301"/>
+                        <a14:foregroundMark x1="65868" y1="38523" x2="65868" y2="38523"/>
+                        <a14:foregroundMark x1="83832" y1="30539" x2="83832" y2="30539"/>
+                        <a14:foregroundMark x1="77246" y1="41717" x2="77246" y2="41717"/>
+                        <a14:foregroundMark x1="43713" y1="57685" x2="43713" y2="57685"/>
+                        <a14:foregroundMark x1="44711" y1="64671" x2="44711" y2="64671"/>
+                        <a14:foregroundMark x1="46108" y1="59281" x2="46108" y2="59281"/>
+                        <a14:foregroundMark x1="48503" y1="53094" x2="48503" y2="53094"/>
+                        <a14:foregroundMark x1="52096" y1="70060" x2="52096" y2="70060"/>
+                        <a14:foregroundMark x1="51697" y1="54890" x2="51697" y2="54890"/>
+                        <a14:foregroundMark x1="61677" y1="74251" x2="61677" y2="74251"/>
+                        <a14:foregroundMark x1="52695" y1="89222" x2="52695" y2="89222"/>
+                        <a14:foregroundMark x1="46906" y1="90818" x2="46906" y2="90818"/>
+                        <a14:foregroundMark x1="46906" y1="86028" x2="46906" y2="86028"/>
+                        <a14:foregroundMark x1="52495" y1="84431" x2="52495" y2="84431"/>
+                        <a14:foregroundMark x1="53293" y1="80040" x2="53293" y2="80040"/>
+                        <a14:foregroundMark x1="46906" y1="83832" x2="46906" y2="83832"/>
+                        <a14:foregroundMark x1="44311" y1="84830" x2="44311" y2="84830"/>
+                        <a14:foregroundMark x1="40519" y1="79242" x2="40519" y2="79242"/>
+                        <a14:foregroundMark x1="40519" y1="73453" x2="40519" y2="73453"/>
+                        <a14:foregroundMark x1="41517" y1="63074" x2="41517" y2="63074"/>
+                        <a14:foregroundMark x1="55689" y1="85629" x2="55689" y2="85629"/>
+                        <a14:foregroundMark x1="58483" y1="77445" x2="58483" y2="77445"/>
+                        <a14:foregroundMark x1="58283" y1="65868" x2="58283" y2="65868"/>
+                        <a14:foregroundMark x1="61477" y1="54291" x2="61477" y2="54291"/>
+                        <a14:foregroundMark x1="53094" y1="49301" x2="53094" y2="49301"/>
+                        <a14:foregroundMark x1="52695" y1="37525" x2="52695" y2="37525"/>
+                        <a14:foregroundMark x1="52096" y1="28144" x2="52096" y2="28144"/>
+                        <a14:foregroundMark x1="69062" y1="31737" x2="69062" y2="31737"/>
+                        <a14:foregroundMark x1="37725" y1="59481" x2="37725" y2="59481"/>
+                        <a14:foregroundMark x1="32735" y1="48503" x2="32735" y2="48503"/>
+                        <a14:foregroundMark x1="75050" y1="33134" x2="75050" y2="33134"/>
+                        <a14:foregroundMark x1="79441" y1="33333" x2="79441" y2="33333"/>
+                        <a14:foregroundMark x1="26547" y1="28543" x2="26547" y2="28543"/>
+                        <a14:foregroundMark x1="14371" y1="10379" x2="14371" y2="10379"/>
+                        <a14:foregroundMark x1="12375" y1="15369" x2="12375" y2="15369"/>
+                        <a14:foregroundMark x1="14770" y1="19361" x2="14770" y2="19361"/>
+                      </a14:backgroundRemoval>
+                    </a14:imgEffect>
+                    <a14:imgEffect>
+                      <a14:sharpenSoften amount="50000"/>
+                    </a14:imgEffect>
+                    <a14:imgEffect>
+                      <a14:colorTemperature colorTemp="11200"/>
+                    </a14:imgEffect>
+                    <a14:imgEffect>
+                      <a14:brightnessContrast contrast="20000"/>
+                    </a14:imgEffect>
+                  </a14:imgLayer>
+                </a14:imgProps>
+              </a:ext>
+              <a:ext uri="{28A0092B-C50C-407E-A947-70E740481C1C}">
+                <a14:useLocalDpi xmlns:a14="http://schemas.microsoft.com/office/drawing/2010/main" val="0"/>
+              </a:ext>
+            </a:extLst>
+          </a:blip>
+          <a:srcRect/>
+          <a:stretch>
+            <a:fillRect/>
+          </a:stretch>
+        </p:blipFill>
+        <p:spPr bwMode="auto">
+          <a:xfrm>
+            <a:off x="1042266" y="1302327"/>
+            <a:ext cx="4772025" cy="4772025"/>
+          </a:xfrm>
+          <a:prstGeom prst="rect">
+            <a:avLst/>
+          </a:prstGeom>
+          <a:noFill/>
+          <a:extLst>
+            <a:ext uri="{909E8E84-426E-40DD-AFC4-6F175D3DCCD1}">
+              <a14:hiddenFill xmlns:a14="http://schemas.microsoft.com/office/drawing/2010/main">
+                <a:solidFill>
+                  <a:srgbClr val="FFFFFF"/>
+                </a:solidFill>
+              </a14:hiddenFill>
+            </a:ext>
+          </a:extLst>
+        </p:spPr>
+      </p:pic>
+    </p:spTree>
+    <p:extLst>
+      <p:ext uri="{BB962C8B-B14F-4D97-AF65-F5344CB8AC3E}">
+        <p14:creationId xmlns:p14="http://schemas.microsoft.com/office/powerpoint/2010/main" val="864564288"/>
+      </p:ext>
+    </p:extLst>
+  </p:cSld>
+  <p:clrMapOvr>
+    <a:masterClrMapping/>
+  </p:clrMapOvr>
+</p:sld>
+</file>
+
 <file path=ppt/theme/theme1.xml><?xml version="1.0" encoding="utf-8"?>
 <a:theme xmlns:a="http://schemas.openxmlformats.org/drawingml/2006/main" name="Office Theme">
   <a:themeElements>

</xml_diff>